<commit_message>
init the last lesson
</commit_message>
<xml_diff>
--- a/Lessons/M_unsupervised/A_Unsupervised_Learning.pptx
+++ b/Lessons/M_unsupervised/A_Unsupervised_Learning.pptx
@@ -16807,7 +16807,7 @@
           <a:p>
             <a:fld id="{C333ABA6-B72D-4ED4-A6E7-13A0DAE65F1A}" type="datetimeFigureOut">
               <a:rPr lang="en-US" smtClean="0"/>
-              <a:t>12/4/23</a:t>
+              <a:t>4/28/24</a:t>
             </a:fld>
             <a:endParaRPr lang="en-US"/>
           </a:p>
@@ -17290,7 +17290,7 @@
           <a:p>
             <a:fld id="{5738B90E-0779-4C36-915C-6F05FCD89456}" type="datetime1">
               <a:rPr lang="en-US" smtClean="0"/>
-              <a:t>12/4/23</a:t>
+              <a:t>4/28/24</a:t>
             </a:fld>
             <a:endParaRPr lang="en-US"/>
           </a:p>
@@ -17508,7 +17508,7 @@
           <a:p>
             <a:fld id="{7B9EA29D-D431-42FE-B7B6-AAE4454C77D3}" type="datetime1">
               <a:rPr lang="en-US" smtClean="0"/>
-              <a:t>12/4/23</a:t>
+              <a:t>4/28/24</a:t>
             </a:fld>
             <a:endParaRPr lang="en-US"/>
           </a:p>
@@ -17768,7 +17768,7 @@
           <a:p>
             <a:fld id="{690D8A1E-EA8F-46C1-B891-AE0C00D9C314}" type="datetime1">
               <a:rPr lang="en-US" smtClean="0"/>
-              <a:t>12/4/23</a:t>
+              <a:t>4/28/24</a:t>
             </a:fld>
             <a:endParaRPr lang="en-US"/>
           </a:p>
@@ -18062,7 +18062,7 @@
           <a:p>
             <a:fld id="{D753EFC8-4232-4598-94F6-94C0EBAFC469}" type="datetime1">
               <a:rPr lang="en-US" smtClean="0"/>
-              <a:t>12/4/23</a:t>
+              <a:t>4/28/24</a:t>
             </a:fld>
             <a:endParaRPr lang="en-US"/>
           </a:p>
@@ -18377,7 +18377,7 @@
           <a:p>
             <a:fld id="{F3161074-1C18-4AE7-957D-F18524378C85}" type="datetime1">
               <a:rPr lang="en-US" smtClean="0"/>
-              <a:t>12/4/23</a:t>
+              <a:t>4/28/24</a:t>
             </a:fld>
             <a:endParaRPr lang="en-US"/>
           </a:p>
@@ -18651,7 +18651,7 @@
           <a:p>
             <a:fld id="{69BE256C-8D9A-4404-B47D-41A1AE514425}" type="datetime1">
               <a:rPr lang="en-US" smtClean="0"/>
-              <a:t>12/4/23</a:t>
+              <a:t>4/28/24</a:t>
             </a:fld>
             <a:endParaRPr lang="en-US"/>
           </a:p>
@@ -19085,7 +19085,7 @@
           <a:p>
             <a:fld id="{66CB2154-9035-4012-8189-BAAB61C5A5EE}" type="datetime1">
               <a:rPr lang="en-US" smtClean="0"/>
-              <a:t>12/4/23</a:t>
+              <a:t>4/28/24</a:t>
             </a:fld>
             <a:endParaRPr lang="en-US"/>
           </a:p>
@@ -19259,7 +19259,7 @@
           <a:p>
             <a:fld id="{6700A58B-DD98-43D0-B791-721480A02982}" type="datetime1">
               <a:rPr lang="en-US" smtClean="0"/>
-              <a:t>12/4/23</a:t>
+              <a:t>4/28/24</a:t>
             </a:fld>
             <a:endParaRPr lang="en-US"/>
           </a:p>
@@ -19451,7 +19451,7 @@
           <a:p>
             <a:fld id="{7DB6E382-4F61-4E24-BE1A-377EC83D0E3A}" type="datetime1">
               <a:rPr lang="en-US" smtClean="0"/>
-              <a:t>12/4/23</a:t>
+              <a:t>4/28/24</a:t>
             </a:fld>
             <a:endParaRPr lang="en-US"/>
           </a:p>
@@ -19762,7 +19762,7 @@
           <a:p>
             <a:fld id="{4142EED6-FC16-45B9-B8C4-2BC5DBA88325}" type="datetime1">
               <a:rPr lang="en-US" smtClean="0"/>
-              <a:t>12/4/23</a:t>
+              <a:t>4/28/24</a:t>
             </a:fld>
             <a:endParaRPr lang="en-US"/>
           </a:p>
@@ -20080,7 +20080,7 @@
           <a:p>
             <a:fld id="{DF59512B-4F1D-43D7-8819-2F53FEF69650}" type="datetime1">
               <a:rPr lang="en-US" smtClean="0"/>
-              <a:t>12/4/23</a:t>
+              <a:t>4/28/24</a:t>
             </a:fld>
             <a:endParaRPr lang="en-US"/>
           </a:p>
@@ -20356,7 +20356,7 @@
           <a:p>
             <a:fld id="{08437B94-E2BF-44DC-ADC5-B05FC9934E9D}" type="datetime1">
               <a:rPr lang="en-US" smtClean="0"/>
-              <a:t>12/4/23</a:t>
+              <a:t>4/28/24</a:t>
             </a:fld>
             <a:endParaRPr lang="en-US"/>
           </a:p>
@@ -20879,7 +20879,7 @@
           <a:p>
             <a:fld id="{5738B90E-0779-4C36-915C-6F05FCD89456}" type="datetime1">
               <a:rPr lang="en-US" smtClean="0"/>
-              <a:t>12/4/23</a:t>
+              <a:t>4/28/24</a:t>
             </a:fld>
             <a:endParaRPr lang="en-US"/>
           </a:p>
@@ -20996,7 +20996,7 @@
           <a:p>
             <a:fld id="{6700A58B-DD98-43D0-B791-721480A02982}" type="datetime1">
               <a:rPr lang="en-US" smtClean="0"/>
-              <a:t>12/4/23</a:t>
+              <a:t>4/28/24</a:t>
             </a:fld>
             <a:endParaRPr lang="en-US"/>
           </a:p>
@@ -21519,7 +21519,7 @@
             <a:fld id="{6700A58B-DD98-43D0-B791-721480A02982}" type="datetime1">
               <a:rPr lang="en-US" smtClean="0"/>
               <a:pPr/>
-              <a:t>12/4/23</a:t>
+              <a:t>4/28/24</a:t>
             </a:fld>
             <a:endParaRPr lang="en-US"/>
           </a:p>
@@ -22145,7 +22145,7 @@
             <a:fld id="{6700A58B-DD98-43D0-B791-721480A02982}" type="datetime1">
               <a:rPr lang="en-US" smtClean="0"/>
               <a:pPr/>
-              <a:t>12/4/23</a:t>
+              <a:t>4/28/24</a:t>
             </a:fld>
             <a:endParaRPr lang="en-US"/>
           </a:p>
@@ -22895,7 +22895,7 @@
             <a:fld id="{6700A58B-DD98-43D0-B791-721480A02982}" type="datetime1">
               <a:rPr lang="en-US" smtClean="0"/>
               <a:pPr/>
-              <a:t>12/4/23</a:t>
+              <a:t>4/28/24</a:t>
             </a:fld>
             <a:endParaRPr lang="en-US"/>
           </a:p>
@@ -24389,7 +24389,7 @@
             <a:fld id="{6700A58B-DD98-43D0-B791-721480A02982}" type="datetime1">
               <a:rPr lang="en-US" smtClean="0"/>
               <a:pPr/>
-              <a:t>12/4/23</a:t>
+              <a:t>4/28/24</a:t>
             </a:fld>
             <a:endParaRPr lang="en-US"/>
           </a:p>
@@ -25282,7 +25282,7 @@
           <a:p>
             <a:fld id="{6700A58B-DD98-43D0-B791-721480A02982}" type="datetime1">
               <a:rPr lang="en-US" smtClean="0"/>
-              <a:t>12/4/23</a:t>
+              <a:t>4/28/24</a:t>
             </a:fld>
             <a:endParaRPr lang="en-US"/>
           </a:p>
@@ -26055,7 +26055,7 @@
             <a:fld id="{6700A58B-DD98-43D0-B791-721480A02982}" type="datetime1">
               <a:rPr lang="en-US" smtClean="0"/>
               <a:pPr/>
-              <a:t>12/4/23</a:t>
+              <a:t>4/28/24</a:t>
             </a:fld>
             <a:endParaRPr lang="en-US"/>
           </a:p>
@@ -27054,7 +27054,7 @@
             <a:fld id="{6700A58B-DD98-43D0-B791-721480A02982}" type="datetime1">
               <a:rPr lang="en-US" smtClean="0"/>
               <a:pPr/>
-              <a:t>12/4/23</a:t>
+              <a:t>4/28/24</a:t>
             </a:fld>
             <a:endParaRPr lang="en-US"/>
           </a:p>
@@ -27741,7 +27741,7 @@
           <a:p>
             <a:fld id="{6700A58B-DD98-43D0-B791-721480A02982}" type="datetime1">
               <a:rPr lang="en-US" smtClean="0"/>
-              <a:t>12/4/23</a:t>
+              <a:t>4/28/24</a:t>
             </a:fld>
             <a:endParaRPr lang="en-US"/>
           </a:p>
@@ -28361,7 +28361,7 @@
           <a:p>
             <a:fld id="{6700A58B-DD98-43D0-B791-721480A02982}" type="datetime1">
               <a:rPr lang="en-US" smtClean="0"/>
-              <a:t>12/4/23</a:t>
+              <a:t>4/28/24</a:t>
             </a:fld>
             <a:endParaRPr lang="en-US"/>
           </a:p>
@@ -30882,7 +30882,7 @@
           <a:p>
             <a:fld id="{6700A58B-DD98-43D0-B791-721480A02982}" type="datetime1">
               <a:rPr lang="en-US" smtClean="0"/>
-              <a:t>12/4/23</a:t>
+              <a:t>4/28/24</a:t>
             </a:fld>
             <a:endParaRPr lang="en-US"/>
           </a:p>
@@ -32399,7 +32399,7 @@
           <a:p>
             <a:fld id="{6700A58B-DD98-43D0-B791-721480A02982}" type="datetime1">
               <a:rPr lang="en-US" smtClean="0"/>
-              <a:t>12/4/23</a:t>
+              <a:t>4/28/24</a:t>
             </a:fld>
             <a:endParaRPr lang="en-US"/>
           </a:p>
@@ -32930,7 +32930,7 @@
           <a:p>
             <a:fld id="{6700A58B-DD98-43D0-B791-721480A02982}" type="datetime1">
               <a:rPr lang="en-US" smtClean="0"/>
-              <a:t>12/4/23</a:t>
+              <a:t>4/28/24</a:t>
             </a:fld>
             <a:endParaRPr lang="en-US"/>
           </a:p>
@@ -32959,11 +32959,15 @@
           <a:p>
             <a:r>
               <a:rPr lang="en-US" dirty="0"/>
-              <a:t>Open </a:t>
+              <a:t>Open A</a:t>
+            </a:r>
+            <a:r>
+              <a:rPr lang="en-US"/>
+              <a:t>_</a:t>
             </a:r>
             <a:r>
               <a:rPr lang="en-US" dirty="0" err="1"/>
-              <a:t>C_kmean_clustering.R</a:t>
+              <a:t>kmean_clustering.R</a:t>
             </a:r>
             <a:endParaRPr lang="en-US" dirty="0"/>
           </a:p>
@@ -33207,7 +33211,7 @@
           <a:p>
             <a:fld id="{D753EFC8-4232-4598-94F6-94C0EBAFC469}" type="datetime1">
               <a:rPr lang="en-US" smtClean="0"/>
-              <a:t>12/4/23</a:t>
+              <a:t>4/28/24</a:t>
             </a:fld>
             <a:endParaRPr lang="en-US"/>
           </a:p>
@@ -35125,7 +35129,7 @@
           <a:p>
             <a:fld id="{6700A58B-DD98-43D0-B791-721480A02982}" type="datetime1">
               <a:rPr lang="en-US" smtClean="0"/>
-              <a:t>12/4/23</a:t>
+              <a:t>4/28/24</a:t>
             </a:fld>
             <a:endParaRPr lang="en-US"/>
           </a:p>
@@ -35456,7 +35460,7 @@
           <a:p>
             <a:fld id="{6700A58B-DD98-43D0-B791-721480A02982}" type="datetime1">
               <a:rPr lang="en-US" smtClean="0"/>
-              <a:t>12/4/23</a:t>
+              <a:t>4/28/24</a:t>
             </a:fld>
             <a:endParaRPr lang="en-US"/>
           </a:p>
@@ -36423,7 +36427,7 @@
           <a:p>
             <a:fld id="{6700A58B-DD98-43D0-B791-721480A02982}" type="datetime1">
               <a:rPr lang="en-US" smtClean="0"/>
-              <a:t>12/4/23</a:t>
+              <a:t>4/28/24</a:t>
             </a:fld>
             <a:endParaRPr lang="en-US"/>
           </a:p>
@@ -36862,7 +36866,7 @@
           <a:p>
             <a:fld id="{6700A58B-DD98-43D0-B791-721480A02982}" type="datetime1">
               <a:rPr lang="en-US" smtClean="0"/>
-              <a:t>12/4/23</a:t>
+              <a:t>4/28/24</a:t>
             </a:fld>
             <a:endParaRPr lang="en-US"/>
           </a:p>
@@ -37624,7 +37628,7 @@
           <a:p>
             <a:fld id="{6700A58B-DD98-43D0-B791-721480A02982}" type="datetime1">
               <a:rPr lang="en-US" smtClean="0"/>
-              <a:t>12/4/23</a:t>
+              <a:t>4/28/24</a:t>
             </a:fld>
             <a:endParaRPr lang="en-US"/>
           </a:p>
@@ -38272,7 +38276,7 @@
           <a:p>
             <a:fld id="{6700A58B-DD98-43D0-B791-721480A02982}" type="datetime1">
               <a:rPr lang="en-US" smtClean="0"/>
-              <a:t>12/4/23</a:t>
+              <a:t>4/28/24</a:t>
             </a:fld>
             <a:endParaRPr lang="en-US"/>
           </a:p>

</xml_diff>